<commit_message>
220624 SW: pjt plannig modified
</commit_message>
<xml_diff>
--- a/기획/04_Component.pptx
+++ b/기획/04_Component.pptx
@@ -209,7 +209,7 @@
           <a:p>
             <a:fld id="{EE58CC16-8CBC-4B09-BC7D-AE7402C8A603}" type="datetimeFigureOut">
               <a:rPr lang="ko-KR" altLang="en-US" smtClean="0"/>
-              <a:t>2022-06-10</a:t>
+              <a:t>2022-06-24</a:t>
             </a:fld>
             <a:endParaRPr lang="ko-KR" altLang="en-US"/>
           </a:p>
@@ -692,7 +692,7 @@
           <a:p>
             <a:fld id="{336D942D-82BF-447B-A290-71B948707332}" type="datetimeFigureOut">
               <a:rPr lang="ko-KR" altLang="en-US" smtClean="0"/>
-              <a:t>2022-06-10</a:t>
+              <a:t>2022-06-24</a:t>
             </a:fld>
             <a:endParaRPr lang="ko-KR" altLang="en-US"/>
           </a:p>
@@ -862,7 +862,7 @@
           <a:p>
             <a:fld id="{336D942D-82BF-447B-A290-71B948707332}" type="datetimeFigureOut">
               <a:rPr lang="ko-KR" altLang="en-US" smtClean="0"/>
-              <a:t>2022-06-10</a:t>
+              <a:t>2022-06-24</a:t>
             </a:fld>
             <a:endParaRPr lang="ko-KR" altLang="en-US"/>
           </a:p>
@@ -1042,7 +1042,7 @@
           <a:p>
             <a:fld id="{336D942D-82BF-447B-A290-71B948707332}" type="datetimeFigureOut">
               <a:rPr lang="ko-KR" altLang="en-US" smtClean="0"/>
-              <a:t>2022-06-10</a:t>
+              <a:t>2022-06-24</a:t>
             </a:fld>
             <a:endParaRPr lang="ko-KR" altLang="en-US"/>
           </a:p>
@@ -1212,7 +1212,7 @@
           <a:p>
             <a:fld id="{336D942D-82BF-447B-A290-71B948707332}" type="datetimeFigureOut">
               <a:rPr lang="ko-KR" altLang="en-US" smtClean="0"/>
-              <a:t>2022-06-10</a:t>
+              <a:t>2022-06-24</a:t>
             </a:fld>
             <a:endParaRPr lang="ko-KR" altLang="en-US"/>
           </a:p>
@@ -1458,7 +1458,7 @@
           <a:p>
             <a:fld id="{336D942D-82BF-447B-A290-71B948707332}" type="datetimeFigureOut">
               <a:rPr lang="ko-KR" altLang="en-US" smtClean="0"/>
-              <a:t>2022-06-10</a:t>
+              <a:t>2022-06-24</a:t>
             </a:fld>
             <a:endParaRPr lang="ko-KR" altLang="en-US"/>
           </a:p>
@@ -1690,7 +1690,7 @@
           <a:p>
             <a:fld id="{336D942D-82BF-447B-A290-71B948707332}" type="datetimeFigureOut">
               <a:rPr lang="ko-KR" altLang="en-US" smtClean="0"/>
-              <a:t>2022-06-10</a:t>
+              <a:t>2022-06-24</a:t>
             </a:fld>
             <a:endParaRPr lang="ko-KR" altLang="en-US"/>
           </a:p>
@@ -2057,7 +2057,7 @@
           <a:p>
             <a:fld id="{336D942D-82BF-447B-A290-71B948707332}" type="datetimeFigureOut">
               <a:rPr lang="ko-KR" altLang="en-US" smtClean="0"/>
-              <a:t>2022-06-10</a:t>
+              <a:t>2022-06-24</a:t>
             </a:fld>
             <a:endParaRPr lang="ko-KR" altLang="en-US"/>
           </a:p>
@@ -2175,7 +2175,7 @@
           <a:p>
             <a:fld id="{336D942D-82BF-447B-A290-71B948707332}" type="datetimeFigureOut">
               <a:rPr lang="ko-KR" altLang="en-US" smtClean="0"/>
-              <a:t>2022-06-10</a:t>
+              <a:t>2022-06-24</a:t>
             </a:fld>
             <a:endParaRPr lang="ko-KR" altLang="en-US"/>
           </a:p>
@@ -2270,7 +2270,7 @@
           <a:p>
             <a:fld id="{336D942D-82BF-447B-A290-71B948707332}" type="datetimeFigureOut">
               <a:rPr lang="ko-KR" altLang="en-US" smtClean="0"/>
-              <a:t>2022-06-10</a:t>
+              <a:t>2022-06-24</a:t>
             </a:fld>
             <a:endParaRPr lang="ko-KR" altLang="en-US"/>
           </a:p>
@@ -2547,7 +2547,7 @@
           <a:p>
             <a:fld id="{336D942D-82BF-447B-A290-71B948707332}" type="datetimeFigureOut">
               <a:rPr lang="ko-KR" altLang="en-US" smtClean="0"/>
-              <a:t>2022-06-10</a:t>
+              <a:t>2022-06-24</a:t>
             </a:fld>
             <a:endParaRPr lang="ko-KR" altLang="en-US"/>
           </a:p>
@@ -2800,7 +2800,7 @@
           <a:p>
             <a:fld id="{336D942D-82BF-447B-A290-71B948707332}" type="datetimeFigureOut">
               <a:rPr lang="ko-KR" altLang="en-US" smtClean="0"/>
-              <a:t>2022-06-10</a:t>
+              <a:t>2022-06-24</a:t>
             </a:fld>
             <a:endParaRPr lang="ko-KR" altLang="en-US"/>
           </a:p>
@@ -3013,7 +3013,7 @@
           <a:p>
             <a:fld id="{336D942D-82BF-447B-A290-71B948707332}" type="datetimeFigureOut">
               <a:rPr lang="ko-KR" altLang="en-US" smtClean="0"/>
-              <a:t>2022-06-10</a:t>
+              <a:t>2022-06-24</a:t>
             </a:fld>
             <a:endParaRPr lang="ko-KR" altLang="en-US"/>
           </a:p>
@@ -3533,7 +3533,7 @@
         </p:nvSpPr>
         <p:spPr>
           <a:xfrm>
-            <a:off x="7626462" y="291221"/>
+            <a:off x="7775109" y="291221"/>
             <a:ext cx="1800000" cy="720000"/>
           </a:xfrm>
           <a:prstGeom prst="rect">
@@ -3601,7 +3601,7 @@
         <p:spPr>
           <a:xfrm>
             <a:off x="6963482" y="651221"/>
-            <a:ext cx="662980" cy="0"/>
+            <a:ext cx="811627" cy="0"/>
           </a:xfrm>
           <a:prstGeom prst="straightConnector1">
             <a:avLst/>
@@ -3632,13 +3632,13 @@
       </p:cxnSp>
       <p:sp>
         <p:nvSpPr>
-          <p:cNvPr id="12" name="직사각형 11"/>
+          <p:cNvPr id="7" name="직사각형 6"/>
           <p:cNvSpPr/>
           <p:nvPr/>
         </p:nvSpPr>
         <p:spPr>
           <a:xfrm>
-            <a:off x="3249352" y="1544276"/>
+            <a:off x="6276462" y="1544276"/>
             <a:ext cx="2700000" cy="4680000"/>
           </a:xfrm>
           <a:prstGeom prst="rect">
@@ -3689,7 +3689,7 @@
             <a:pPr algn="ctr"/>
             <a:r>
               <a:rPr lang="en-US" altLang="ko-KR" b="1" dirty="0" err="1" smtClean="0"/>
-              <a:t>MyPage</a:t>
+              <a:t>TeamPage</a:t>
             </a:r>
             <a:endParaRPr lang="ko-KR" altLang="en-US" b="1" dirty="0"/>
           </a:p>
@@ -3697,14 +3697,14 @@
       </p:sp>
       <p:sp>
         <p:nvSpPr>
-          <p:cNvPr id="18" name="직사각형 17"/>
+          <p:cNvPr id="38" name="직사각형 37"/>
           <p:cNvSpPr/>
           <p:nvPr/>
         </p:nvSpPr>
         <p:spPr>
           <a:xfrm>
-            <a:off x="3411352" y="1992149"/>
-            <a:ext cx="2376000" cy="648000"/>
+            <a:off x="6438462" y="1992149"/>
+            <a:ext cx="2376000" cy="3060000"/>
           </a:xfrm>
           <a:prstGeom prst="rect">
             <a:avLst/>
@@ -3748,13 +3748,13 @@
           </a:fontRef>
         </p:style>
         <p:txBody>
-          <a:bodyPr rtlCol="0" anchor="ctr"/>
+          <a:bodyPr rtlCol="0" anchor="t"/>
           <a:lstStyle/>
           <a:p>
             <a:pPr algn="ctr"/>
             <a:r>
               <a:rPr lang="en-US" altLang="ko-KR" b="1" dirty="0" err="1" smtClean="0"/>
-              <a:t>ProfilePage</a:t>
+              <a:t>MyTeamPage</a:t>
             </a:r>
             <a:endParaRPr lang="ko-KR" altLang="en-US" b="1" dirty="0"/>
           </a:p>
@@ -3762,14 +3762,14 @@
       </p:sp>
       <p:sp>
         <p:nvSpPr>
-          <p:cNvPr id="54" name="직사각형 53"/>
+          <p:cNvPr id="75" name="직사각형 74"/>
           <p:cNvSpPr/>
           <p:nvPr/>
         </p:nvSpPr>
         <p:spPr>
           <a:xfrm>
-            <a:off x="3411352" y="2842228"/>
-            <a:ext cx="2376000" cy="360000"/>
+            <a:off x="6636462" y="2482228"/>
+            <a:ext cx="1980000" cy="900000"/>
           </a:xfrm>
           <a:prstGeom prst="rect">
             <a:avLst/>
@@ -3813,7 +3813,7 @@
           </a:fontRef>
         </p:style>
         <p:txBody>
-          <a:bodyPr rtlCol="0" anchor="ctr"/>
+          <a:bodyPr rtlCol="0" anchor="t"/>
           <a:lstStyle/>
           <a:p>
             <a:pPr algn="ctr"/>
@@ -3825,7 +3825,7 @@
                   </a:schemeClr>
                 </a:solidFill>
               </a:rPr>
-              <a:t>ProfileEdit</a:t>
+              <a:t>TeamEditView</a:t>
             </a:r>
             <a:endParaRPr lang="ko-KR" altLang="en-US" sz="1400" b="1" dirty="0">
               <a:solidFill>
@@ -3837,228 +3837,83 @@
           </a:p>
         </p:txBody>
       </p:sp>
-      <p:grpSp>
-        <p:nvGrpSpPr>
-          <p:cNvPr id="37" name="그룹 36"/>
-          <p:cNvGrpSpPr/>
+      <p:sp>
+        <p:nvSpPr>
+          <p:cNvPr id="31" name="직사각형 30"/>
+          <p:cNvSpPr/>
           <p:nvPr/>
-        </p:nvGrpSpPr>
-        <p:grpSpPr>
+        </p:nvSpPr>
+        <p:spPr>
           <a:xfrm>
-            <a:off x="6276462" y="1544276"/>
-            <a:ext cx="2700000" cy="4680000"/>
-            <a:chOff x="6276462" y="1544276"/>
-            <a:chExt cx="2700000" cy="4680000"/>
-          </a:xfrm>
-        </p:grpSpPr>
-        <p:sp>
-          <p:nvSpPr>
-            <p:cNvPr id="7" name="직사각형 6"/>
-            <p:cNvSpPr/>
-            <p:nvPr/>
-          </p:nvSpPr>
-          <p:spPr>
-            <a:xfrm>
-              <a:off x="6276462" y="1544276"/>
-              <a:ext cx="2700000" cy="4680000"/>
-            </a:xfrm>
-            <a:prstGeom prst="rect">
-              <a:avLst/>
-            </a:prstGeom>
+            <a:off x="6636462" y="3784409"/>
+            <a:ext cx="1980000" cy="900000"/>
+          </a:xfrm>
+          <a:prstGeom prst="rect">
+            <a:avLst/>
+          </a:prstGeom>
+          <a:solidFill>
+            <a:schemeClr val="accent1">
+              <a:lumMod val="20000"/>
+              <a:lumOff val="80000"/>
+            </a:schemeClr>
+          </a:solidFill>
+          <a:ln w="6350">
             <a:solidFill>
-              <a:schemeClr val="accent1">
-                <a:lumMod val="75000"/>
-                <a:alpha val="70000"/>
+              <a:schemeClr val="tx1">
+                <a:lumMod val="50000"/>
+                <a:lumOff val="50000"/>
               </a:schemeClr>
             </a:solidFill>
-            <a:ln w="6350">
-              <a:solidFill>
-                <a:schemeClr val="tx1">
-                  <a:lumMod val="50000"/>
-                  <a:lumOff val="50000"/>
-                </a:schemeClr>
-              </a:solidFill>
-            </a:ln>
-            <a:effectLst>
-              <a:outerShdw blurRad="50800" dist="38100" dir="2700000" algn="tl" rotWithShape="0">
-                <a:prstClr val="black">
-                  <a:alpha val="40000"/>
-                </a:prstClr>
-              </a:outerShdw>
-            </a:effectLst>
-          </p:spPr>
-          <p:style>
-            <a:lnRef idx="2">
-              <a:schemeClr val="accent4">
-                <a:shade val="50000"/>
-              </a:schemeClr>
-            </a:lnRef>
-            <a:fillRef idx="1">
-              <a:schemeClr val="accent4"/>
-            </a:fillRef>
-            <a:effectRef idx="0">
-              <a:schemeClr val="accent4"/>
-            </a:effectRef>
-            <a:fontRef idx="minor">
-              <a:schemeClr val="lt1"/>
-            </a:fontRef>
-          </p:style>
-          <p:txBody>
-            <a:bodyPr rtlCol="0" anchor="t"/>
-            <a:lstStyle/>
-            <a:p>
-              <a:pPr algn="ctr"/>
-              <a:r>
-                <a:rPr lang="en-US" altLang="ko-KR" b="1" dirty="0" err="1" smtClean="0"/>
-                <a:t>TeamPage</a:t>
-              </a:r>
-              <a:endParaRPr lang="ko-KR" altLang="en-US" b="1" dirty="0"/>
-            </a:p>
-          </p:txBody>
-        </p:sp>
-        <p:sp>
-          <p:nvSpPr>
-            <p:cNvPr id="38" name="직사각형 37"/>
-            <p:cNvSpPr/>
-            <p:nvPr/>
-          </p:nvSpPr>
-          <p:spPr>
-            <a:xfrm>
-              <a:off x="6438462" y="1992149"/>
-              <a:ext cx="2376000" cy="648000"/>
-            </a:xfrm>
-            <a:prstGeom prst="rect">
-              <a:avLst/>
-            </a:prstGeom>
-            <a:solidFill>
-              <a:schemeClr val="accent1">
-                <a:lumMod val="60000"/>
-                <a:lumOff val="40000"/>
-              </a:schemeClr>
-            </a:solidFill>
-            <a:ln w="6350">
-              <a:solidFill>
-                <a:schemeClr val="tx1">
-                  <a:lumMod val="50000"/>
-                  <a:lumOff val="50000"/>
-                </a:schemeClr>
-              </a:solidFill>
-            </a:ln>
-            <a:effectLst>
-              <a:outerShdw blurRad="50800" dist="38100" dir="2700000" algn="tl" rotWithShape="0">
-                <a:prstClr val="black">
-                  <a:alpha val="40000"/>
-                </a:prstClr>
-              </a:outerShdw>
-            </a:effectLst>
-          </p:spPr>
-          <p:style>
-            <a:lnRef idx="2">
-              <a:schemeClr val="accent1">
-                <a:shade val="50000"/>
-              </a:schemeClr>
-            </a:lnRef>
-            <a:fillRef idx="1">
-              <a:schemeClr val="accent1"/>
-            </a:fillRef>
-            <a:effectRef idx="0">
-              <a:schemeClr val="accent1"/>
-            </a:effectRef>
-            <a:fontRef idx="minor">
-              <a:schemeClr val="lt1"/>
-            </a:fontRef>
-          </p:style>
-          <p:txBody>
-            <a:bodyPr rtlCol="0" anchor="ctr"/>
-            <a:lstStyle/>
-            <a:p>
-              <a:pPr algn="ctr"/>
-              <a:r>
-                <a:rPr lang="en-US" altLang="ko-KR" b="1" dirty="0" err="1" smtClean="0"/>
-                <a:t>TeamPage</a:t>
-              </a:r>
-              <a:endParaRPr lang="ko-KR" altLang="en-US" b="1" dirty="0"/>
-            </a:p>
-          </p:txBody>
-        </p:sp>
-        <p:sp>
-          <p:nvSpPr>
-            <p:cNvPr id="75" name="직사각형 74"/>
-            <p:cNvSpPr/>
-            <p:nvPr/>
-          </p:nvSpPr>
-          <p:spPr>
-            <a:xfrm>
-              <a:off x="6438462" y="2842228"/>
-              <a:ext cx="2376000" cy="360000"/>
-            </a:xfrm>
-            <a:prstGeom prst="rect">
-              <a:avLst/>
-            </a:prstGeom>
-            <a:solidFill>
-              <a:schemeClr val="accent1">
-                <a:lumMod val="20000"/>
-                <a:lumOff val="80000"/>
-              </a:schemeClr>
-            </a:solidFill>
-            <a:ln w="6350">
-              <a:solidFill>
-                <a:schemeClr val="tx1">
-                  <a:lumMod val="50000"/>
-                  <a:lumOff val="50000"/>
-                </a:schemeClr>
-              </a:solidFill>
-            </a:ln>
-            <a:effectLst>
-              <a:outerShdw blurRad="50800" dist="38100" dir="2700000" algn="tl" rotWithShape="0">
-                <a:prstClr val="black">
-                  <a:alpha val="40000"/>
-                </a:prstClr>
-              </a:outerShdw>
-            </a:effectLst>
-          </p:spPr>
-          <p:style>
-            <a:lnRef idx="2">
-              <a:schemeClr val="accent1">
-                <a:shade val="50000"/>
-              </a:schemeClr>
-            </a:lnRef>
-            <a:fillRef idx="1">
-              <a:schemeClr val="accent1"/>
-            </a:fillRef>
-            <a:effectRef idx="0">
-              <a:schemeClr val="accent1"/>
-            </a:effectRef>
-            <a:fontRef idx="minor">
-              <a:schemeClr val="lt1"/>
-            </a:fontRef>
-          </p:style>
-          <p:txBody>
-            <a:bodyPr rtlCol="0" anchor="ctr"/>
-            <a:lstStyle/>
-            <a:p>
-              <a:pPr algn="ctr"/>
-              <a:r>
-                <a:rPr lang="en-US" altLang="ko-KR" sz="1400" b="1" dirty="0" err="1" smtClean="0">
-                  <a:solidFill>
-                    <a:schemeClr val="bg2">
-                      <a:lumMod val="50000"/>
-                    </a:schemeClr>
-                  </a:solidFill>
-                </a:rPr>
-                <a:t>TeamEdit</a:t>
-              </a:r>
-              <a:endParaRPr lang="ko-KR" altLang="en-US" sz="1400" b="1" dirty="0">
+          </a:ln>
+          <a:effectLst>
+            <a:outerShdw blurRad="50800" dist="38100" dir="2700000" algn="tl" rotWithShape="0">
+              <a:prstClr val="black">
+                <a:alpha val="40000"/>
+              </a:prstClr>
+            </a:outerShdw>
+          </a:effectLst>
+        </p:spPr>
+        <p:style>
+          <a:lnRef idx="2">
+            <a:schemeClr val="accent1">
+              <a:shade val="50000"/>
+            </a:schemeClr>
+          </a:lnRef>
+          <a:fillRef idx="1">
+            <a:schemeClr val="accent1"/>
+          </a:fillRef>
+          <a:effectRef idx="0">
+            <a:schemeClr val="accent1"/>
+          </a:effectRef>
+          <a:fontRef idx="minor">
+            <a:schemeClr val="lt1"/>
+          </a:fontRef>
+        </p:style>
+        <p:txBody>
+          <a:bodyPr rtlCol="0" anchor="t"/>
+          <a:lstStyle/>
+          <a:p>
+            <a:pPr algn="ctr"/>
+            <a:r>
+              <a:rPr lang="en-US" altLang="ko-KR" sz="1400" b="1" dirty="0" err="1" smtClean="0">
                 <a:solidFill>
                   <a:schemeClr val="bg2">
                     <a:lumMod val="50000"/>
                   </a:schemeClr>
                 </a:solidFill>
-              </a:endParaRPr>
-            </a:p>
-          </p:txBody>
-        </p:sp>
-      </p:grpSp>
+              </a:rPr>
+              <a:t>TeamNewView</a:t>
+            </a:r>
+            <a:endParaRPr lang="ko-KR" altLang="en-US" sz="1400" b="1" dirty="0">
+              <a:solidFill>
+                <a:schemeClr val="bg2">
+                  <a:lumMod val="50000"/>
+                </a:schemeClr>
+              </a:solidFill>
+            </a:endParaRPr>
+          </a:p>
+        </p:txBody>
+      </p:sp>
       <p:sp>
         <p:nvSpPr>
           <p:cNvPr id="10" name="직사각형 9"/>
@@ -4133,7 +3988,7 @@
         <p:spPr>
           <a:xfrm>
             <a:off x="9465572" y="1992149"/>
-            <a:ext cx="2376000" cy="648000"/>
+            <a:ext cx="2376000" cy="1620000"/>
           </a:xfrm>
           <a:prstGeom prst="rect">
             <a:avLst/>
@@ -4177,7 +4032,7 @@
           </a:fontRef>
         </p:style>
         <p:txBody>
-          <a:bodyPr rtlCol="0" anchor="ctr"/>
+          <a:bodyPr rtlCol="0" anchor="t"/>
           <a:lstStyle/>
           <a:p>
             <a:pPr algn="ctr"/>
@@ -4197,7 +4052,7 @@
         </p:nvSpPr>
         <p:spPr>
           <a:xfrm>
-            <a:off x="9963172" y="291221"/>
+            <a:off x="10203572" y="291221"/>
             <a:ext cx="1800000" cy="720000"/>
           </a:xfrm>
           <a:prstGeom prst="rect">
@@ -4382,380 +4237,211 @@
           </a:fontRef>
         </p:style>
       </p:cxnSp>
-      <p:grpSp>
-        <p:nvGrpSpPr>
-          <p:cNvPr id="34" name="그룹 33"/>
-          <p:cNvGrpSpPr/>
+      <p:sp>
+        <p:nvSpPr>
+          <p:cNvPr id="62" name="직사각형 61"/>
+          <p:cNvSpPr/>
           <p:nvPr/>
-        </p:nvGrpSpPr>
-        <p:grpSpPr>
+        </p:nvSpPr>
+        <p:spPr>
           <a:xfrm>
             <a:off x="222242" y="1544276"/>
             <a:ext cx="2700000" cy="4680000"/>
-            <a:chOff x="222242" y="1544276"/>
-            <a:chExt cx="2700000" cy="4680000"/>
-          </a:xfrm>
-        </p:grpSpPr>
-        <p:sp>
-          <p:nvSpPr>
-            <p:cNvPr id="62" name="직사각형 61"/>
-            <p:cNvSpPr/>
-            <p:nvPr/>
-          </p:nvSpPr>
-          <p:spPr>
-            <a:xfrm>
-              <a:off x="222242" y="1544276"/>
-              <a:ext cx="2700000" cy="4680000"/>
-            </a:xfrm>
-            <a:prstGeom prst="rect">
-              <a:avLst/>
-            </a:prstGeom>
+          </a:xfrm>
+          <a:prstGeom prst="rect">
+            <a:avLst/>
+          </a:prstGeom>
+          <a:solidFill>
+            <a:schemeClr val="accent1">
+              <a:lumMod val="75000"/>
+              <a:alpha val="70000"/>
+            </a:schemeClr>
+          </a:solidFill>
+          <a:ln w="6350">
             <a:solidFill>
-              <a:schemeClr val="accent1">
-                <a:lumMod val="75000"/>
-                <a:alpha val="70000"/>
+              <a:schemeClr val="tx1">
+                <a:lumMod val="50000"/>
+                <a:lumOff val="50000"/>
               </a:schemeClr>
             </a:solidFill>
-            <a:ln w="6350">
-              <a:solidFill>
-                <a:schemeClr val="tx1">
-                  <a:lumMod val="50000"/>
-                  <a:lumOff val="50000"/>
-                </a:schemeClr>
-              </a:solidFill>
-            </a:ln>
-            <a:effectLst>
-              <a:outerShdw blurRad="50800" dist="38100" dir="2700000" algn="tl" rotWithShape="0">
-                <a:prstClr val="black">
-                  <a:alpha val="40000"/>
-                </a:prstClr>
-              </a:outerShdw>
-            </a:effectLst>
-          </p:spPr>
-          <p:style>
-            <a:lnRef idx="2">
-              <a:schemeClr val="accent4">
-                <a:shade val="50000"/>
-              </a:schemeClr>
-            </a:lnRef>
-            <a:fillRef idx="1">
-              <a:schemeClr val="accent4"/>
-            </a:fillRef>
-            <a:effectRef idx="0">
-              <a:schemeClr val="accent4"/>
-            </a:effectRef>
-            <a:fontRef idx="minor">
-              <a:schemeClr val="lt1"/>
-            </a:fontRef>
-          </p:style>
-          <p:txBody>
-            <a:bodyPr rtlCol="0" anchor="t"/>
-            <a:lstStyle/>
-            <a:p>
-              <a:pPr algn="ctr"/>
-              <a:r>
-                <a:rPr lang="en-US" altLang="ko-KR" b="1" dirty="0" err="1" smtClean="0"/>
-                <a:t>MainPage</a:t>
-              </a:r>
-              <a:endParaRPr lang="ko-KR" altLang="en-US" b="1" dirty="0"/>
-            </a:p>
-          </p:txBody>
-        </p:sp>
-        <p:sp>
-          <p:nvSpPr>
-            <p:cNvPr id="63" name="직사각형 62"/>
-            <p:cNvSpPr/>
-            <p:nvPr/>
-          </p:nvSpPr>
-          <p:spPr>
-            <a:xfrm>
-              <a:off x="384242" y="1992149"/>
-              <a:ext cx="2376000" cy="648000"/>
-            </a:xfrm>
-            <a:prstGeom prst="rect">
-              <a:avLst/>
-            </a:prstGeom>
+          </a:ln>
+          <a:effectLst>
+            <a:outerShdw blurRad="50800" dist="38100" dir="2700000" algn="tl" rotWithShape="0">
+              <a:prstClr val="black">
+                <a:alpha val="40000"/>
+              </a:prstClr>
+            </a:outerShdw>
+          </a:effectLst>
+        </p:spPr>
+        <p:style>
+          <a:lnRef idx="2">
+            <a:schemeClr val="accent4">
+              <a:shade val="50000"/>
+            </a:schemeClr>
+          </a:lnRef>
+          <a:fillRef idx="1">
+            <a:schemeClr val="accent4"/>
+          </a:fillRef>
+          <a:effectRef idx="0">
+            <a:schemeClr val="accent4"/>
+          </a:effectRef>
+          <a:fontRef idx="minor">
+            <a:schemeClr val="lt1"/>
+          </a:fontRef>
+        </p:style>
+        <p:txBody>
+          <a:bodyPr rtlCol="0" anchor="t"/>
+          <a:lstStyle/>
+          <a:p>
+            <a:pPr algn="ctr"/>
+            <a:r>
+              <a:rPr lang="en-US" altLang="ko-KR" b="1" dirty="0" err="1" smtClean="0"/>
+              <a:t>MainPage</a:t>
+            </a:r>
+            <a:endParaRPr lang="ko-KR" altLang="en-US" b="1" dirty="0"/>
+          </a:p>
+        </p:txBody>
+      </p:sp>
+      <p:sp>
+        <p:nvSpPr>
+          <p:cNvPr id="63" name="직사각형 62"/>
+          <p:cNvSpPr/>
+          <p:nvPr/>
+        </p:nvSpPr>
+        <p:spPr>
+          <a:xfrm>
+            <a:off x="384242" y="1992149"/>
+            <a:ext cx="2376000" cy="1620000"/>
+          </a:xfrm>
+          <a:prstGeom prst="rect">
+            <a:avLst/>
+          </a:prstGeom>
+          <a:solidFill>
+            <a:schemeClr val="accent1">
+              <a:lumMod val="60000"/>
+              <a:lumOff val="40000"/>
+            </a:schemeClr>
+          </a:solidFill>
+          <a:ln w="6350">
             <a:solidFill>
-              <a:schemeClr val="accent1">
-                <a:lumMod val="60000"/>
-                <a:lumOff val="40000"/>
+              <a:schemeClr val="tx1">
+                <a:lumMod val="50000"/>
+                <a:lumOff val="50000"/>
               </a:schemeClr>
             </a:solidFill>
-            <a:ln w="6350">
-              <a:solidFill>
-                <a:schemeClr val="tx1">
-                  <a:lumMod val="50000"/>
-                  <a:lumOff val="50000"/>
-                </a:schemeClr>
-              </a:solidFill>
-            </a:ln>
-            <a:effectLst>
-              <a:outerShdw blurRad="50800" dist="38100" dir="2700000" algn="tl" rotWithShape="0">
-                <a:prstClr val="black">
-                  <a:alpha val="40000"/>
-                </a:prstClr>
-              </a:outerShdw>
-            </a:effectLst>
-          </p:spPr>
-          <p:style>
-            <a:lnRef idx="2">
-              <a:schemeClr val="accent1">
-                <a:shade val="50000"/>
-              </a:schemeClr>
-            </a:lnRef>
-            <a:fillRef idx="1">
-              <a:schemeClr val="accent1"/>
-            </a:fillRef>
-            <a:effectRef idx="0">
-              <a:schemeClr val="accent1"/>
-            </a:effectRef>
-            <a:fontRef idx="minor">
-              <a:schemeClr val="lt1"/>
-            </a:fontRef>
-          </p:style>
-          <p:txBody>
-            <a:bodyPr rtlCol="0" anchor="ctr"/>
-            <a:lstStyle/>
-            <a:p>
-              <a:pPr algn="ctr"/>
-              <a:r>
-                <a:rPr lang="en-US" altLang="ko-KR" b="1" dirty="0" err="1" smtClean="0"/>
-                <a:t>TeamCardList</a:t>
-              </a:r>
-              <a:endParaRPr lang="ko-KR" altLang="en-US" b="1" dirty="0"/>
-            </a:p>
-          </p:txBody>
-        </p:sp>
-        <p:sp>
-          <p:nvSpPr>
-            <p:cNvPr id="72" name="직사각형 71"/>
-            <p:cNvSpPr/>
-            <p:nvPr/>
-          </p:nvSpPr>
-          <p:spPr>
-            <a:xfrm>
-              <a:off x="384242" y="3966386"/>
-              <a:ext cx="2376000" cy="648000"/>
-            </a:xfrm>
-            <a:prstGeom prst="rect">
-              <a:avLst/>
-            </a:prstGeom>
+          </a:ln>
+          <a:effectLst>
+            <a:outerShdw blurRad="50800" dist="38100" dir="2700000" algn="tl" rotWithShape="0">
+              <a:prstClr val="black">
+                <a:alpha val="40000"/>
+              </a:prstClr>
+            </a:outerShdw>
+          </a:effectLst>
+        </p:spPr>
+        <p:style>
+          <a:lnRef idx="2">
+            <a:schemeClr val="accent1">
+              <a:shade val="50000"/>
+            </a:schemeClr>
+          </a:lnRef>
+          <a:fillRef idx="1">
+            <a:schemeClr val="accent1"/>
+          </a:fillRef>
+          <a:effectRef idx="0">
+            <a:schemeClr val="accent1"/>
+          </a:effectRef>
+          <a:fontRef idx="minor">
+            <a:schemeClr val="lt1"/>
+          </a:fontRef>
+        </p:style>
+        <p:txBody>
+          <a:bodyPr rtlCol="0" anchor="t"/>
+          <a:lstStyle/>
+          <a:p>
+            <a:pPr algn="ctr"/>
+            <a:r>
+              <a:rPr lang="en-US" altLang="ko-KR" b="1" dirty="0" err="1" smtClean="0"/>
+              <a:t>TeamList</a:t>
+            </a:r>
+            <a:endParaRPr lang="ko-KR" altLang="en-US" b="1" dirty="0"/>
+          </a:p>
+        </p:txBody>
+      </p:sp>
+      <p:sp>
+        <p:nvSpPr>
+          <p:cNvPr id="72" name="직사각형 71"/>
+          <p:cNvSpPr/>
+          <p:nvPr/>
+        </p:nvSpPr>
+        <p:spPr>
+          <a:xfrm>
+            <a:off x="384242" y="3966386"/>
+            <a:ext cx="2376000" cy="1620000"/>
+          </a:xfrm>
+          <a:prstGeom prst="rect">
+            <a:avLst/>
+          </a:prstGeom>
+          <a:solidFill>
+            <a:schemeClr val="accent1">
+              <a:lumMod val="60000"/>
+              <a:lumOff val="40000"/>
+            </a:schemeClr>
+          </a:solidFill>
+          <a:ln w="6350">
             <a:solidFill>
-              <a:schemeClr val="accent1">
-                <a:lumMod val="60000"/>
-                <a:lumOff val="40000"/>
+              <a:schemeClr val="tx1">
+                <a:lumMod val="50000"/>
+                <a:lumOff val="50000"/>
               </a:schemeClr>
             </a:solidFill>
-            <a:ln w="6350">
-              <a:solidFill>
-                <a:schemeClr val="tx1">
-                  <a:lumMod val="50000"/>
-                  <a:lumOff val="50000"/>
-                </a:schemeClr>
-              </a:solidFill>
-            </a:ln>
-            <a:effectLst>
-              <a:outerShdw blurRad="50800" dist="38100" dir="2700000" algn="tl" rotWithShape="0">
-                <a:prstClr val="black">
-                  <a:alpha val="40000"/>
-                </a:prstClr>
-              </a:outerShdw>
-            </a:effectLst>
-          </p:spPr>
-          <p:style>
-            <a:lnRef idx="2">
-              <a:schemeClr val="accent1">
-                <a:shade val="50000"/>
-              </a:schemeClr>
-            </a:lnRef>
-            <a:fillRef idx="1">
-              <a:schemeClr val="accent1"/>
-            </a:fillRef>
-            <a:effectRef idx="0">
-              <a:schemeClr val="accent1"/>
-            </a:effectRef>
-            <a:fontRef idx="minor">
-              <a:schemeClr val="lt1"/>
-            </a:fontRef>
-          </p:style>
-          <p:txBody>
-            <a:bodyPr rtlCol="0" anchor="ctr"/>
-            <a:lstStyle/>
-            <a:p>
-              <a:pPr algn="ctr"/>
-              <a:r>
-                <a:rPr lang="en-US" altLang="ko-KR" b="1" dirty="0" err="1" smtClean="0"/>
-                <a:t>PersonalCardList</a:t>
-              </a:r>
-              <a:endParaRPr lang="ko-KR" altLang="en-US" b="1" dirty="0"/>
-            </a:p>
-          </p:txBody>
-        </p:sp>
-        <p:sp>
-          <p:nvSpPr>
-            <p:cNvPr id="73" name="직사각형 72"/>
-            <p:cNvSpPr/>
-            <p:nvPr/>
-          </p:nvSpPr>
-          <p:spPr>
-            <a:xfrm>
-              <a:off x="384242" y="2842228"/>
-              <a:ext cx="2376000" cy="360000"/>
-            </a:xfrm>
-            <a:prstGeom prst="rect">
-              <a:avLst/>
-            </a:prstGeom>
-            <a:solidFill>
-              <a:schemeClr val="accent1">
-                <a:lumMod val="20000"/>
-                <a:lumOff val="80000"/>
-              </a:schemeClr>
-            </a:solidFill>
-            <a:ln w="6350">
-              <a:solidFill>
-                <a:schemeClr val="tx1">
-                  <a:lumMod val="50000"/>
-                  <a:lumOff val="50000"/>
-                </a:schemeClr>
-              </a:solidFill>
-            </a:ln>
-            <a:effectLst>
-              <a:outerShdw blurRad="50800" dist="38100" dir="2700000" algn="tl" rotWithShape="0">
-                <a:prstClr val="black">
-                  <a:alpha val="40000"/>
-                </a:prstClr>
-              </a:outerShdw>
-            </a:effectLst>
-          </p:spPr>
-          <p:style>
-            <a:lnRef idx="2">
-              <a:schemeClr val="accent1">
-                <a:shade val="50000"/>
-              </a:schemeClr>
-            </a:lnRef>
-            <a:fillRef idx="1">
-              <a:schemeClr val="accent1"/>
-            </a:fillRef>
-            <a:effectRef idx="0">
-              <a:schemeClr val="accent1"/>
-            </a:effectRef>
-            <a:fontRef idx="minor">
-              <a:schemeClr val="lt1"/>
-            </a:fontRef>
-          </p:style>
-          <p:txBody>
-            <a:bodyPr rtlCol="0" anchor="ctr"/>
-            <a:lstStyle/>
-            <a:p>
-              <a:pPr algn="ctr"/>
-              <a:r>
-                <a:rPr lang="en-US" altLang="ko-KR" sz="1400" b="1" dirty="0" err="1" smtClean="0">
-                  <a:solidFill>
-                    <a:schemeClr val="bg2">
-                      <a:lumMod val="50000"/>
-                    </a:schemeClr>
-                  </a:solidFill>
-                </a:rPr>
-                <a:t>TeamCardDetail</a:t>
-              </a:r>
-              <a:endParaRPr lang="ko-KR" altLang="en-US" sz="1400" b="1" dirty="0">
-                <a:solidFill>
-                  <a:schemeClr val="bg2">
-                    <a:lumMod val="50000"/>
-                  </a:schemeClr>
-                </a:solidFill>
-              </a:endParaRPr>
-            </a:p>
-          </p:txBody>
-        </p:sp>
-        <p:sp>
-          <p:nvSpPr>
-            <p:cNvPr id="74" name="직사각형 73"/>
-            <p:cNvSpPr/>
-            <p:nvPr/>
-          </p:nvSpPr>
-          <p:spPr>
-            <a:xfrm>
-              <a:off x="384242" y="4764683"/>
-              <a:ext cx="2376000" cy="360000"/>
-            </a:xfrm>
-            <a:prstGeom prst="rect">
-              <a:avLst/>
-            </a:prstGeom>
-            <a:solidFill>
-              <a:schemeClr val="accent1">
-                <a:lumMod val="20000"/>
-                <a:lumOff val="80000"/>
-              </a:schemeClr>
-            </a:solidFill>
-            <a:ln w="6350">
-              <a:solidFill>
-                <a:schemeClr val="tx1">
-                  <a:lumMod val="50000"/>
-                  <a:lumOff val="50000"/>
-                </a:schemeClr>
-              </a:solidFill>
-            </a:ln>
-            <a:effectLst>
-              <a:outerShdw blurRad="50800" dist="38100" dir="2700000" algn="tl" rotWithShape="0">
-                <a:prstClr val="black">
-                  <a:alpha val="40000"/>
-                </a:prstClr>
-              </a:outerShdw>
-            </a:effectLst>
-          </p:spPr>
-          <p:style>
-            <a:lnRef idx="2">
-              <a:schemeClr val="accent1">
-                <a:shade val="50000"/>
-              </a:schemeClr>
-            </a:lnRef>
-            <a:fillRef idx="1">
-              <a:schemeClr val="accent1"/>
-            </a:fillRef>
-            <a:effectRef idx="0">
-              <a:schemeClr val="accent1"/>
-            </a:effectRef>
-            <a:fontRef idx="minor">
-              <a:schemeClr val="lt1"/>
-            </a:fontRef>
-          </p:style>
-          <p:txBody>
-            <a:bodyPr rtlCol="0" anchor="ctr"/>
-            <a:lstStyle/>
-            <a:p>
-              <a:pPr algn="ctr"/>
-              <a:r>
-                <a:rPr lang="en-US" altLang="ko-KR" sz="1400" b="1" dirty="0" err="1" smtClean="0">
-                  <a:solidFill>
-                    <a:schemeClr val="bg2">
-                      <a:lumMod val="50000"/>
-                    </a:schemeClr>
-                  </a:solidFill>
-                </a:rPr>
-                <a:t>PersonalCardDetail</a:t>
-              </a:r>
-              <a:endParaRPr lang="ko-KR" altLang="en-US" sz="1400" b="1" dirty="0">
-                <a:solidFill>
-                  <a:schemeClr val="bg2">
-                    <a:lumMod val="50000"/>
-                  </a:schemeClr>
-                </a:solidFill>
-              </a:endParaRPr>
-            </a:p>
-          </p:txBody>
-        </p:sp>
-      </p:grpSp>
-      <p:sp>
-        <p:nvSpPr>
-          <p:cNvPr id="76" name="직사각형 75"/>
+          </a:ln>
+          <a:effectLst>
+            <a:outerShdw blurRad="50800" dist="38100" dir="2700000" algn="tl" rotWithShape="0">
+              <a:prstClr val="black">
+                <a:alpha val="40000"/>
+              </a:prstClr>
+            </a:outerShdw>
+          </a:effectLst>
+        </p:spPr>
+        <p:style>
+          <a:lnRef idx="2">
+            <a:schemeClr val="accent1">
+              <a:shade val="50000"/>
+            </a:schemeClr>
+          </a:lnRef>
+          <a:fillRef idx="1">
+            <a:schemeClr val="accent1"/>
+          </a:fillRef>
+          <a:effectRef idx="0">
+            <a:schemeClr val="accent1"/>
+          </a:effectRef>
+          <a:fontRef idx="minor">
+            <a:schemeClr val="lt1"/>
+          </a:fontRef>
+        </p:style>
+        <p:txBody>
+          <a:bodyPr rtlCol="0" anchor="t"/>
+          <a:lstStyle/>
+          <a:p>
+            <a:pPr algn="ctr"/>
+            <a:r>
+              <a:rPr lang="en-US" altLang="ko-KR" b="1" dirty="0" err="1" smtClean="0"/>
+              <a:t>MemberList</a:t>
+            </a:r>
+            <a:endParaRPr lang="ko-KR" altLang="en-US" b="1" dirty="0"/>
+          </a:p>
+        </p:txBody>
+      </p:sp>
+      <p:sp>
+        <p:nvSpPr>
+          <p:cNvPr id="73" name="직사각형 72"/>
           <p:cNvSpPr/>
           <p:nvPr/>
         </p:nvSpPr>
         <p:spPr>
           <a:xfrm>
-            <a:off x="3411352" y="3404307"/>
-            <a:ext cx="2376000" cy="360000"/>
+            <a:off x="582242" y="2482228"/>
+            <a:ext cx="1980000" cy="360000"/>
           </a:xfrm>
           <a:prstGeom prst="rect">
             <a:avLst/>
@@ -4811,7 +4497,7 @@
                   </a:schemeClr>
                 </a:solidFill>
               </a:rPr>
-              <a:t>SignOut</a:t>
+              <a:t>TeamModal</a:t>
             </a:r>
             <a:endParaRPr lang="ko-KR" altLang="en-US" sz="1400" b="1" dirty="0">
               <a:solidFill>
@@ -4825,14 +4511,14 @@
       </p:sp>
       <p:sp>
         <p:nvSpPr>
-          <p:cNvPr id="77" name="직사각형 76"/>
+          <p:cNvPr id="74" name="직사각형 73"/>
           <p:cNvSpPr/>
           <p:nvPr/>
         </p:nvSpPr>
         <p:spPr>
           <a:xfrm>
-            <a:off x="3411352" y="3966386"/>
-            <a:ext cx="2376000" cy="360000"/>
+            <a:off x="582242" y="4504409"/>
+            <a:ext cx="1980000" cy="360000"/>
           </a:xfrm>
           <a:prstGeom prst="rect">
             <a:avLst/>
@@ -4888,7 +4574,522 @@
                   </a:schemeClr>
                 </a:solidFill>
               </a:rPr>
+              <a:t>MemberModal</a:t>
+            </a:r>
+            <a:endParaRPr lang="ko-KR" altLang="en-US" sz="1400" b="1" dirty="0">
+              <a:solidFill>
+                <a:schemeClr val="bg2">
+                  <a:lumMod val="50000"/>
+                </a:schemeClr>
+              </a:solidFill>
+            </a:endParaRPr>
+          </a:p>
+        </p:txBody>
+      </p:sp>
+      <p:sp>
+        <p:nvSpPr>
+          <p:cNvPr id="12" name="직사각형 11"/>
+          <p:cNvSpPr/>
+          <p:nvPr/>
+        </p:nvSpPr>
+        <p:spPr>
+          <a:xfrm>
+            <a:off x="3249352" y="1544276"/>
+            <a:ext cx="2700000" cy="4680000"/>
+          </a:xfrm>
+          <a:prstGeom prst="rect">
+            <a:avLst/>
+          </a:prstGeom>
+          <a:solidFill>
+            <a:schemeClr val="accent1">
+              <a:lumMod val="75000"/>
+              <a:alpha val="70000"/>
+            </a:schemeClr>
+          </a:solidFill>
+          <a:ln w="6350">
+            <a:solidFill>
+              <a:schemeClr val="tx1">
+                <a:lumMod val="50000"/>
+                <a:lumOff val="50000"/>
+              </a:schemeClr>
+            </a:solidFill>
+          </a:ln>
+          <a:effectLst>
+            <a:outerShdw blurRad="50800" dist="38100" dir="2700000" algn="tl" rotWithShape="0">
+              <a:prstClr val="black">
+                <a:alpha val="40000"/>
+              </a:prstClr>
+            </a:outerShdw>
+          </a:effectLst>
+        </p:spPr>
+        <p:style>
+          <a:lnRef idx="2">
+            <a:schemeClr val="accent4">
+              <a:shade val="50000"/>
+            </a:schemeClr>
+          </a:lnRef>
+          <a:fillRef idx="1">
+            <a:schemeClr val="accent4"/>
+          </a:fillRef>
+          <a:effectRef idx="0">
+            <a:schemeClr val="accent4"/>
+          </a:effectRef>
+          <a:fontRef idx="minor">
+            <a:schemeClr val="lt1"/>
+          </a:fontRef>
+        </p:style>
+        <p:txBody>
+          <a:bodyPr rtlCol="0" anchor="t"/>
+          <a:lstStyle/>
+          <a:p>
+            <a:pPr algn="ctr"/>
+            <a:r>
+              <a:rPr lang="en-US" altLang="ko-KR" b="1" dirty="0" err="1" smtClean="0"/>
+              <a:t>MyPage</a:t>
+            </a:r>
+            <a:endParaRPr lang="ko-KR" altLang="en-US" b="1" dirty="0"/>
+          </a:p>
+        </p:txBody>
+      </p:sp>
+      <p:sp>
+        <p:nvSpPr>
+          <p:cNvPr id="18" name="직사각형 17"/>
+          <p:cNvSpPr/>
+          <p:nvPr/>
+        </p:nvSpPr>
+        <p:spPr>
+          <a:xfrm>
+            <a:off x="3411352" y="1992149"/>
+            <a:ext cx="2376000" cy="1620000"/>
+          </a:xfrm>
+          <a:prstGeom prst="rect">
+            <a:avLst/>
+          </a:prstGeom>
+          <a:solidFill>
+            <a:schemeClr val="accent1">
+              <a:lumMod val="60000"/>
+              <a:lumOff val="40000"/>
+            </a:schemeClr>
+          </a:solidFill>
+          <a:ln w="6350">
+            <a:solidFill>
+              <a:schemeClr val="tx1">
+                <a:lumMod val="50000"/>
+                <a:lumOff val="50000"/>
+              </a:schemeClr>
+            </a:solidFill>
+          </a:ln>
+          <a:effectLst>
+            <a:outerShdw blurRad="50800" dist="38100" dir="2700000" algn="tl" rotWithShape="0">
+              <a:prstClr val="black">
+                <a:alpha val="40000"/>
+              </a:prstClr>
+            </a:outerShdw>
+          </a:effectLst>
+        </p:spPr>
+        <p:style>
+          <a:lnRef idx="2">
+            <a:schemeClr val="accent1">
+              <a:shade val="50000"/>
+            </a:schemeClr>
+          </a:lnRef>
+          <a:fillRef idx="1">
+            <a:schemeClr val="accent1"/>
+          </a:fillRef>
+          <a:effectRef idx="0">
+            <a:schemeClr val="accent1"/>
+          </a:effectRef>
+          <a:fontRef idx="minor">
+            <a:schemeClr val="lt1"/>
+          </a:fontRef>
+        </p:style>
+        <p:txBody>
+          <a:bodyPr rtlCol="0" anchor="t"/>
+          <a:lstStyle/>
+          <a:p>
+            <a:pPr algn="ctr"/>
+            <a:r>
+              <a:rPr lang="en-US" altLang="ko-KR" b="1" dirty="0" err="1" smtClean="0"/>
+              <a:t>MyPage</a:t>
+            </a:r>
+            <a:endParaRPr lang="ko-KR" altLang="en-US" b="1" dirty="0"/>
+          </a:p>
+        </p:txBody>
+      </p:sp>
+      <p:sp>
+        <p:nvSpPr>
+          <p:cNvPr id="54" name="직사각형 53"/>
+          <p:cNvSpPr/>
+          <p:nvPr/>
+        </p:nvSpPr>
+        <p:spPr>
+          <a:xfrm>
+            <a:off x="3609352" y="2482226"/>
+            <a:ext cx="1980000" cy="900000"/>
+          </a:xfrm>
+          <a:prstGeom prst="rect">
+            <a:avLst/>
+          </a:prstGeom>
+          <a:solidFill>
+            <a:schemeClr val="accent1">
+              <a:lumMod val="20000"/>
+              <a:lumOff val="80000"/>
+            </a:schemeClr>
+          </a:solidFill>
+          <a:ln w="6350">
+            <a:solidFill>
+              <a:schemeClr val="tx1">
+                <a:lumMod val="50000"/>
+                <a:lumOff val="50000"/>
+              </a:schemeClr>
+            </a:solidFill>
+          </a:ln>
+          <a:effectLst>
+            <a:outerShdw blurRad="50800" dist="38100" dir="2700000" algn="tl" rotWithShape="0">
+              <a:prstClr val="black">
+                <a:alpha val="40000"/>
+              </a:prstClr>
+            </a:outerShdw>
+          </a:effectLst>
+        </p:spPr>
+        <p:style>
+          <a:lnRef idx="2">
+            <a:schemeClr val="accent1">
+              <a:shade val="50000"/>
+            </a:schemeClr>
+          </a:lnRef>
+          <a:fillRef idx="1">
+            <a:schemeClr val="accent1"/>
+          </a:fillRef>
+          <a:effectRef idx="0">
+            <a:schemeClr val="accent1"/>
+          </a:effectRef>
+          <a:fontRef idx="minor">
+            <a:schemeClr val="lt1"/>
+          </a:fontRef>
+        </p:style>
+        <p:txBody>
+          <a:bodyPr rtlCol="0" anchor="t"/>
+          <a:lstStyle/>
+          <a:p>
+            <a:pPr algn="ctr"/>
+            <a:r>
+              <a:rPr lang="en-US" altLang="ko-KR" sz="1400" b="1" dirty="0" err="1" smtClean="0">
+                <a:solidFill>
+                  <a:schemeClr val="bg2">
+                    <a:lumMod val="50000"/>
+                  </a:schemeClr>
+                </a:solidFill>
+              </a:rPr>
+              <a:t>MyPageEdit</a:t>
+            </a:r>
+            <a:endParaRPr lang="ko-KR" altLang="en-US" sz="1400" b="1" dirty="0">
+              <a:solidFill>
+                <a:schemeClr val="bg2">
+                  <a:lumMod val="50000"/>
+                </a:schemeClr>
+              </a:solidFill>
+            </a:endParaRPr>
+          </a:p>
+        </p:txBody>
+      </p:sp>
+      <p:sp>
+        <p:nvSpPr>
+          <p:cNvPr id="77" name="직사각형 76"/>
+          <p:cNvSpPr/>
+          <p:nvPr/>
+        </p:nvSpPr>
+        <p:spPr>
+          <a:xfrm>
+            <a:off x="3789352" y="2811220"/>
+            <a:ext cx="1620000" cy="360000"/>
+          </a:xfrm>
+          <a:prstGeom prst="rect">
+            <a:avLst/>
+          </a:prstGeom>
+          <a:solidFill>
+            <a:schemeClr val="accent5">
+              <a:lumMod val="40000"/>
+              <a:lumOff val="60000"/>
+            </a:schemeClr>
+          </a:solidFill>
+          <a:ln w="6350">
+            <a:solidFill>
+              <a:schemeClr val="tx1">
+                <a:lumMod val="50000"/>
+                <a:lumOff val="50000"/>
+              </a:schemeClr>
+            </a:solidFill>
+          </a:ln>
+          <a:effectLst>
+            <a:outerShdw blurRad="50800" dist="38100" dir="2700000" algn="tl" rotWithShape="0">
+              <a:prstClr val="black">
+                <a:alpha val="40000"/>
+              </a:prstClr>
+            </a:outerShdw>
+          </a:effectLst>
+        </p:spPr>
+        <p:style>
+          <a:lnRef idx="2">
+            <a:schemeClr val="accent1">
+              <a:shade val="50000"/>
+            </a:schemeClr>
+          </a:lnRef>
+          <a:fillRef idx="1">
+            <a:schemeClr val="accent1"/>
+          </a:fillRef>
+          <a:effectRef idx="0">
+            <a:schemeClr val="accent1"/>
+          </a:effectRef>
+          <a:fontRef idx="minor">
+            <a:schemeClr val="lt1"/>
+          </a:fontRef>
+        </p:style>
+        <p:txBody>
+          <a:bodyPr rtlCol="0" anchor="ctr"/>
+          <a:lstStyle/>
+          <a:p>
+            <a:pPr algn="ctr"/>
+            <a:r>
+              <a:rPr lang="en-US" altLang="ko-KR" sz="1400" b="1" dirty="0" err="1" smtClean="0">
+                <a:solidFill>
+                  <a:schemeClr val="bg2">
+                    <a:lumMod val="50000"/>
+                  </a:schemeClr>
+                </a:solidFill>
+              </a:rPr>
               <a:t>PasswordFind</a:t>
+            </a:r>
+            <a:endParaRPr lang="ko-KR" altLang="en-US" sz="1400" b="1" dirty="0">
+              <a:solidFill>
+                <a:schemeClr val="bg2">
+                  <a:lumMod val="50000"/>
+                </a:schemeClr>
+              </a:solidFill>
+            </a:endParaRPr>
+          </a:p>
+        </p:txBody>
+      </p:sp>
+      <p:sp>
+        <p:nvSpPr>
+          <p:cNvPr id="30" name="직사각형 29"/>
+          <p:cNvSpPr/>
+          <p:nvPr/>
+        </p:nvSpPr>
+        <p:spPr>
+          <a:xfrm>
+            <a:off x="9663572" y="2482226"/>
+            <a:ext cx="1980000" cy="360002"/>
+          </a:xfrm>
+          <a:prstGeom prst="rect">
+            <a:avLst/>
+          </a:prstGeom>
+          <a:solidFill>
+            <a:schemeClr val="accent1">
+              <a:lumMod val="20000"/>
+              <a:lumOff val="80000"/>
+            </a:schemeClr>
+          </a:solidFill>
+          <a:ln w="6350">
+            <a:solidFill>
+              <a:schemeClr val="tx1">
+                <a:lumMod val="50000"/>
+                <a:lumOff val="50000"/>
+              </a:schemeClr>
+            </a:solidFill>
+          </a:ln>
+          <a:effectLst>
+            <a:outerShdw blurRad="50800" dist="38100" dir="2700000" algn="tl" rotWithShape="0">
+              <a:prstClr val="black">
+                <a:alpha val="40000"/>
+              </a:prstClr>
+            </a:outerShdw>
+          </a:effectLst>
+        </p:spPr>
+        <p:style>
+          <a:lnRef idx="2">
+            <a:schemeClr val="accent1">
+              <a:shade val="50000"/>
+            </a:schemeClr>
+          </a:lnRef>
+          <a:fillRef idx="1">
+            <a:schemeClr val="accent1"/>
+          </a:fillRef>
+          <a:effectRef idx="0">
+            <a:schemeClr val="accent1"/>
+          </a:effectRef>
+          <a:fontRef idx="minor">
+            <a:schemeClr val="lt1"/>
+          </a:fontRef>
+        </p:style>
+        <p:txBody>
+          <a:bodyPr rtlCol="0" anchor="ctr"/>
+          <a:lstStyle/>
+          <a:p>
+            <a:pPr algn="ctr"/>
+            <a:r>
+              <a:rPr lang="en-US" altLang="ko-KR" sz="1400" b="1" dirty="0" err="1" smtClean="0">
+                <a:solidFill>
+                  <a:schemeClr val="bg2">
+                    <a:lumMod val="50000"/>
+                  </a:schemeClr>
+                </a:solidFill>
+              </a:rPr>
+              <a:t>SignUpModal</a:t>
+            </a:r>
+            <a:endParaRPr lang="ko-KR" altLang="en-US" sz="1400" b="1" dirty="0">
+              <a:solidFill>
+                <a:schemeClr val="bg2">
+                  <a:lumMod val="50000"/>
+                </a:schemeClr>
+              </a:solidFill>
+            </a:endParaRPr>
+          </a:p>
+        </p:txBody>
+      </p:sp>
+      <p:sp>
+        <p:nvSpPr>
+          <p:cNvPr id="33" name="직사각형 32"/>
+          <p:cNvSpPr/>
+          <p:nvPr/>
+        </p:nvSpPr>
+        <p:spPr>
+          <a:xfrm>
+            <a:off x="6816462" y="4143195"/>
+            <a:ext cx="1620000" cy="360000"/>
+          </a:xfrm>
+          <a:prstGeom prst="rect">
+            <a:avLst/>
+          </a:prstGeom>
+          <a:solidFill>
+            <a:schemeClr val="accent5">
+              <a:lumMod val="40000"/>
+              <a:lumOff val="60000"/>
+            </a:schemeClr>
+          </a:solidFill>
+          <a:ln w="6350">
+            <a:solidFill>
+              <a:schemeClr val="tx1">
+                <a:lumMod val="50000"/>
+                <a:lumOff val="50000"/>
+              </a:schemeClr>
+            </a:solidFill>
+          </a:ln>
+          <a:effectLst>
+            <a:outerShdw blurRad="50800" dist="38100" dir="2700000" algn="tl" rotWithShape="0">
+              <a:prstClr val="black">
+                <a:alpha val="40000"/>
+              </a:prstClr>
+            </a:outerShdw>
+          </a:effectLst>
+        </p:spPr>
+        <p:style>
+          <a:lnRef idx="2">
+            <a:schemeClr val="accent1">
+              <a:shade val="50000"/>
+            </a:schemeClr>
+          </a:lnRef>
+          <a:fillRef idx="1">
+            <a:schemeClr val="accent1"/>
+          </a:fillRef>
+          <a:effectRef idx="0">
+            <a:schemeClr val="accent1"/>
+          </a:effectRef>
+          <a:fontRef idx="minor">
+            <a:schemeClr val="lt1"/>
+          </a:fontRef>
+        </p:style>
+        <p:txBody>
+          <a:bodyPr rtlCol="0" anchor="ctr"/>
+          <a:lstStyle/>
+          <a:p>
+            <a:pPr algn="ctr"/>
+            <a:r>
+              <a:rPr lang="en-US" altLang="ko-KR" sz="1400" b="1" dirty="0" err="1" smtClean="0">
+                <a:solidFill>
+                  <a:schemeClr val="bg2">
+                    <a:lumMod val="50000"/>
+                  </a:schemeClr>
+                </a:solidFill>
+              </a:rPr>
+              <a:t>TeamCreateForm</a:t>
+            </a:r>
+            <a:endParaRPr lang="ko-KR" altLang="en-US" sz="1400" b="1" dirty="0">
+              <a:solidFill>
+                <a:schemeClr val="bg2">
+                  <a:lumMod val="50000"/>
+                </a:schemeClr>
+              </a:solidFill>
+            </a:endParaRPr>
+          </a:p>
+        </p:txBody>
+      </p:sp>
+      <p:sp>
+        <p:nvSpPr>
+          <p:cNvPr id="36" name="직사각형 35"/>
+          <p:cNvSpPr/>
+          <p:nvPr/>
+        </p:nvSpPr>
+        <p:spPr>
+          <a:xfrm>
+            <a:off x="6816462" y="2811220"/>
+            <a:ext cx="1620000" cy="360000"/>
+          </a:xfrm>
+          <a:prstGeom prst="rect">
+            <a:avLst/>
+          </a:prstGeom>
+          <a:solidFill>
+            <a:schemeClr val="accent5">
+              <a:lumMod val="40000"/>
+              <a:lumOff val="60000"/>
+            </a:schemeClr>
+          </a:solidFill>
+          <a:ln w="6350">
+            <a:solidFill>
+              <a:schemeClr val="tx1">
+                <a:lumMod val="50000"/>
+                <a:lumOff val="50000"/>
+              </a:schemeClr>
+            </a:solidFill>
+          </a:ln>
+          <a:effectLst>
+            <a:outerShdw blurRad="50800" dist="38100" dir="2700000" algn="tl" rotWithShape="0">
+              <a:prstClr val="black">
+                <a:alpha val="40000"/>
+              </a:prstClr>
+            </a:outerShdw>
+          </a:effectLst>
+        </p:spPr>
+        <p:style>
+          <a:lnRef idx="2">
+            <a:schemeClr val="accent1">
+              <a:shade val="50000"/>
+            </a:schemeClr>
+          </a:lnRef>
+          <a:fillRef idx="1">
+            <a:schemeClr val="accent1"/>
+          </a:fillRef>
+          <a:effectRef idx="0">
+            <a:schemeClr val="accent1"/>
+          </a:effectRef>
+          <a:fontRef idx="minor">
+            <a:schemeClr val="lt1"/>
+          </a:fontRef>
+        </p:style>
+        <p:txBody>
+          <a:bodyPr rtlCol="0" anchor="ctr"/>
+          <a:lstStyle/>
+          <a:p>
+            <a:pPr algn="ctr"/>
+            <a:r>
+              <a:rPr lang="en-US" altLang="ko-KR" sz="1400" b="1" dirty="0" err="1" smtClean="0">
+                <a:solidFill>
+                  <a:schemeClr val="bg2">
+                    <a:lumMod val="50000"/>
+                  </a:schemeClr>
+                </a:solidFill>
+              </a:rPr>
+              <a:t>TeamEditForm</a:t>
             </a:r>
             <a:endParaRPr lang="ko-KR" altLang="en-US" sz="1400" b="1" dirty="0">
               <a:solidFill>
@@ -4945,7 +5146,7 @@
         </p:nvSpPr>
         <p:spPr>
           <a:xfrm>
-            <a:off x="5492629" y="3105000"/>
+            <a:off x="1843821" y="3175339"/>
             <a:ext cx="1260000" cy="648000"/>
           </a:xfrm>
           <a:prstGeom prst="rect">
@@ -5018,7 +5219,7 @@
         </p:nvSpPr>
         <p:spPr>
           <a:xfrm>
-            <a:off x="3532052" y="3105000"/>
+            <a:off x="1843821" y="1884685"/>
             <a:ext cx="1260000" cy="648000"/>
           </a:xfrm>
           <a:prstGeom prst="rect">
@@ -5117,8 +5318,8 @@
         </p:nvCxnSpPr>
         <p:spPr>
           <a:xfrm flipV="1">
-            <a:off x="4162052" y="2781001"/>
-            <a:ext cx="0" cy="323999"/>
+            <a:off x="2473821" y="1242031"/>
+            <a:ext cx="0" cy="642654"/>
           </a:xfrm>
           <a:prstGeom prst="straightConnector1">
             <a:avLst/>
@@ -5154,7 +5355,7 @@
         </p:nvSpPr>
         <p:spPr>
           <a:xfrm>
-            <a:off x="3532052" y="2133001"/>
+            <a:off x="1843821" y="594031"/>
             <a:ext cx="1260000" cy="648000"/>
           </a:xfrm>
           <a:prstGeom prst="rect">
@@ -5253,8 +5454,8 @@
         </p:nvCxnSpPr>
         <p:spPr>
           <a:xfrm flipV="1">
-            <a:off x="6752629" y="1495692"/>
-            <a:ext cx="700577" cy="1933308"/>
+            <a:off x="3103821" y="1566031"/>
+            <a:ext cx="2599716" cy="1933308"/>
           </a:xfrm>
           <a:prstGeom prst="straightConnector1">
             <a:avLst/>
@@ -5289,7 +5490,7 @@
         </p:nvSpPr>
         <p:spPr>
           <a:xfrm>
-            <a:off x="7453206" y="1171692"/>
+            <a:off x="5703537" y="1242031"/>
             <a:ext cx="1260000" cy="648000"/>
           </a:xfrm>
           <a:prstGeom prst="rect">
@@ -5359,7 +5560,7 @@
         </p:nvSpPr>
         <p:spPr>
           <a:xfrm>
-            <a:off x="9374370" y="523692"/>
+            <a:off x="7744117" y="594031"/>
             <a:ext cx="1260000" cy="648000"/>
           </a:xfrm>
           <a:prstGeom prst="rect">
@@ -5432,8 +5633,8 @@
         </p:nvCxnSpPr>
         <p:spPr>
           <a:xfrm flipV="1">
-            <a:off x="8713206" y="847692"/>
-            <a:ext cx="661164" cy="648000"/>
+            <a:off x="6963537" y="918031"/>
+            <a:ext cx="780580" cy="648000"/>
           </a:xfrm>
           <a:prstGeom prst="straightConnector1">
             <a:avLst/>
@@ -5468,7 +5669,7 @@
         </p:nvSpPr>
         <p:spPr>
           <a:xfrm>
-            <a:off x="7453206" y="3105000"/>
+            <a:off x="5703537" y="3175339"/>
             <a:ext cx="1260000" cy="648000"/>
           </a:xfrm>
           <a:prstGeom prst="rect">
@@ -5520,7 +5721,7 @@
                   <a:schemeClr val="tx1"/>
                 </a:solidFill>
               </a:rPr>
-              <a:t>팀 페이지</a:t>
+              <a:t>나의 팀 페이지</a:t>
             </a:r>
             <a:endParaRPr lang="ko-KR" altLang="en-US" sz="1400" dirty="0">
               <a:solidFill>
@@ -5541,8 +5742,8 @@
         </p:nvCxnSpPr>
         <p:spPr>
           <a:xfrm>
-            <a:off x="6752629" y="3429000"/>
-            <a:ext cx="700577" cy="0"/>
+            <a:off x="3103821" y="3499339"/>
+            <a:ext cx="2599716" cy="0"/>
           </a:xfrm>
           <a:prstGeom prst="straightConnector1">
             <a:avLst/>
@@ -5580,8 +5781,8 @@
         </p:nvCxnSpPr>
         <p:spPr>
           <a:xfrm>
-            <a:off x="6752629" y="3429000"/>
-            <a:ext cx="736009" cy="1933308"/>
+            <a:off x="3103821" y="3499339"/>
+            <a:ext cx="2635148" cy="2487223"/>
           </a:xfrm>
           <a:prstGeom prst="straightConnector1">
             <a:avLst/>
@@ -5610,86 +5811,13 @@
       </p:cxnSp>
       <p:sp>
         <p:nvSpPr>
-          <p:cNvPr id="31" name="직사각형 30"/>
-          <p:cNvSpPr/>
-          <p:nvPr/>
-        </p:nvSpPr>
-        <p:spPr>
-          <a:xfrm>
-            <a:off x="1571476" y="3105000"/>
-            <a:ext cx="1260000" cy="648000"/>
-          </a:xfrm>
-          <a:prstGeom prst="rect">
-            <a:avLst/>
-          </a:prstGeom>
-          <a:solidFill>
-            <a:schemeClr val="accent1">
-              <a:lumMod val="20000"/>
-              <a:lumOff val="80000"/>
-            </a:schemeClr>
-          </a:solidFill>
-          <a:ln w="6350">
-            <a:solidFill>
-              <a:schemeClr val="tx1">
-                <a:lumMod val="50000"/>
-                <a:lumOff val="50000"/>
-              </a:schemeClr>
-            </a:solidFill>
-          </a:ln>
-          <a:effectLst>
-            <a:outerShdw blurRad="50800" dist="38100" dir="2700000" algn="tl" rotWithShape="0">
-              <a:prstClr val="black">
-                <a:alpha val="40000"/>
-              </a:prstClr>
-            </a:outerShdw>
-          </a:effectLst>
-        </p:spPr>
-        <p:style>
-          <a:lnRef idx="2">
-            <a:schemeClr val="accent1">
-              <a:shade val="50000"/>
-            </a:schemeClr>
-          </a:lnRef>
-          <a:fillRef idx="1">
-            <a:schemeClr val="accent1"/>
-          </a:fillRef>
-          <a:effectRef idx="0">
-            <a:schemeClr val="accent1"/>
-          </a:effectRef>
-          <a:fontRef idx="minor">
-            <a:schemeClr val="lt1"/>
-          </a:fontRef>
-        </p:style>
-        <p:txBody>
-          <a:bodyPr lIns="0" tIns="36000" rIns="0" bIns="36000" rtlCol="0" anchor="ctr"/>
-          <a:lstStyle/>
-          <a:p>
-            <a:pPr algn="ctr"/>
-            <a:r>
-              <a:rPr lang="ko-KR" altLang="en-US" sz="1400" b="1" dirty="0" smtClean="0">
-                <a:solidFill>
-                  <a:schemeClr val="tx1"/>
-                </a:solidFill>
-              </a:rPr>
-              <a:t>메인 페이지</a:t>
-            </a:r>
-            <a:endParaRPr lang="ko-KR" altLang="en-US" sz="1400" dirty="0">
-              <a:solidFill>
-                <a:schemeClr val="tx1"/>
-              </a:solidFill>
-            </a:endParaRPr>
-          </a:p>
-        </p:txBody>
-      </p:sp>
-      <p:sp>
-        <p:nvSpPr>
           <p:cNvPr id="41" name="직사각형 40"/>
           <p:cNvSpPr/>
           <p:nvPr/>
         </p:nvSpPr>
         <p:spPr>
           <a:xfrm>
-            <a:off x="9374370" y="1880182"/>
+            <a:off x="7744117" y="1950521"/>
             <a:ext cx="1260000" cy="648000"/>
           </a:xfrm>
           <a:prstGeom prst="rect">
@@ -5785,8 +5913,8 @@
         </p:nvCxnSpPr>
         <p:spPr>
           <a:xfrm>
-            <a:off x="8713206" y="1495692"/>
-            <a:ext cx="661164" cy="708490"/>
+            <a:off x="6963537" y="1566031"/>
+            <a:ext cx="780580" cy="708490"/>
           </a:xfrm>
           <a:prstGeom prst="straightConnector1">
             <a:avLst/>
@@ -5821,7 +5949,7 @@
         </p:nvSpPr>
         <p:spPr>
           <a:xfrm>
-            <a:off x="9374370" y="3105000"/>
+            <a:off x="7744117" y="3175339"/>
             <a:ext cx="1260000" cy="648000"/>
           </a:xfrm>
           <a:prstGeom prst="rect">
@@ -5873,7 +6001,31 @@
                   <a:schemeClr val="tx1"/>
                 </a:solidFill>
               </a:rPr>
-              <a:t>팀 프로필 수정</a:t>
+              <a:t>나의 팀 프로필 수정</a:t>
+            </a:r>
+            <a:r>
+              <a:rPr lang="en-US" altLang="ko-KR" sz="1400" b="1" dirty="0" smtClean="0">
+                <a:solidFill>
+                  <a:schemeClr val="tx1"/>
+                </a:solidFill>
+              </a:rPr>
+              <a:t>(</a:t>
+            </a:r>
+            <a:r>
+              <a:rPr lang="ko-KR" altLang="en-US" sz="1400" b="1" dirty="0" smtClean="0">
+                <a:solidFill>
+                  <a:schemeClr val="tx1"/>
+                </a:solidFill>
+              </a:rPr>
+              <a:t>팀장</a:t>
+            </a:r>
+            <a:r>
+              <a:rPr lang="en-US" altLang="ko-KR" sz="1400" b="1" dirty="0" smtClean="0">
+                <a:solidFill>
+                  <a:schemeClr val="tx1"/>
+                </a:solidFill>
+              </a:rPr>
+              <a:t>)</a:t>
             </a:r>
             <a:endParaRPr lang="ko-KR" altLang="en-US" sz="1400" dirty="0">
               <a:solidFill>
@@ -5894,8 +6046,8 @@
         </p:nvCxnSpPr>
         <p:spPr>
           <a:xfrm>
-            <a:off x="8713206" y="3429000"/>
-            <a:ext cx="661164" cy="0"/>
+            <a:off x="6963537" y="3499339"/>
+            <a:ext cx="780580" cy="0"/>
           </a:xfrm>
           <a:prstGeom prst="straightConnector1">
             <a:avLst/>
@@ -5904,6 +6056,7 @@
             <a:solidFill>
               <a:schemeClr val="tx2"/>
             </a:solidFill>
+            <a:prstDash val="dash"/>
             <a:tailEnd type="triangle"/>
           </a:ln>
         </p:spPr>
@@ -5922,84 +6075,6 @@
           </a:fontRef>
         </p:style>
       </p:cxnSp>
-      <p:cxnSp>
-        <p:nvCxnSpPr>
-          <p:cNvPr id="62" name="직선 화살표 연결선 61"/>
-          <p:cNvCxnSpPr>
-            <a:stCxn id="31" idx="3"/>
-            <a:endCxn id="5" idx="1"/>
-          </p:cNvCxnSpPr>
-          <p:nvPr/>
-        </p:nvCxnSpPr>
-        <p:spPr>
-          <a:xfrm>
-            <a:off x="2831476" y="3429000"/>
-            <a:ext cx="700576" cy="0"/>
-          </a:xfrm>
-          <a:prstGeom prst="straightConnector1">
-            <a:avLst/>
-          </a:prstGeom>
-          <a:ln w="28575">
-            <a:solidFill>
-              <a:schemeClr val="tx2"/>
-            </a:solidFill>
-            <a:tailEnd type="triangle"/>
-          </a:ln>
-        </p:spPr>
-        <p:style>
-          <a:lnRef idx="1">
-            <a:schemeClr val="accent1"/>
-          </a:lnRef>
-          <a:fillRef idx="0">
-            <a:schemeClr val="accent1"/>
-          </a:fillRef>
-          <a:effectRef idx="0">
-            <a:schemeClr val="accent1"/>
-          </a:effectRef>
-          <a:fontRef idx="minor">
-            <a:schemeClr val="tx1"/>
-          </a:fontRef>
-        </p:style>
-      </p:cxnSp>
-      <p:cxnSp>
-        <p:nvCxnSpPr>
-          <p:cNvPr id="65" name="직선 화살표 연결선 64"/>
-          <p:cNvCxnSpPr>
-            <a:stCxn id="5" idx="3"/>
-            <a:endCxn id="4" idx="1"/>
-          </p:cNvCxnSpPr>
-          <p:nvPr/>
-        </p:nvCxnSpPr>
-        <p:spPr>
-          <a:xfrm>
-            <a:off x="4792052" y="3429000"/>
-            <a:ext cx="700577" cy="0"/>
-          </a:xfrm>
-          <a:prstGeom prst="straightConnector1">
-            <a:avLst/>
-          </a:prstGeom>
-          <a:ln w="28575">
-            <a:solidFill>
-              <a:schemeClr val="tx2"/>
-            </a:solidFill>
-            <a:tailEnd type="triangle"/>
-          </a:ln>
-        </p:spPr>
-        <p:style>
-          <a:lnRef idx="1">
-            <a:schemeClr val="accent1"/>
-          </a:lnRef>
-          <a:fillRef idx="0">
-            <a:schemeClr val="accent1"/>
-          </a:fillRef>
-          <a:effectRef idx="0">
-            <a:schemeClr val="accent1"/>
-          </a:effectRef>
-          <a:fontRef idx="minor">
-            <a:schemeClr val="tx1"/>
-          </a:fontRef>
-        </p:style>
-      </p:cxnSp>
       <p:sp>
         <p:nvSpPr>
           <p:cNvPr id="77" name="직사각형 76"/>
@@ -6008,7 +6083,7 @@
         </p:nvSpPr>
         <p:spPr>
           <a:xfrm>
-            <a:off x="7488638" y="5038308"/>
+            <a:off x="5738969" y="5662562"/>
             <a:ext cx="1260000" cy="648000"/>
           </a:xfrm>
           <a:prstGeom prst="rect">
@@ -6089,25 +6164,62 @@
           </a:p>
         </p:txBody>
       </p:sp>
-      <p:sp>
-        <p:nvSpPr>
-          <p:cNvPr id="81" name="직사각형 80"/>
+      <p:cxnSp>
+        <p:nvCxnSpPr>
+          <p:cNvPr id="27" name="직선 화살표 연결선 26"/>
+          <p:cNvCxnSpPr>
+            <a:stCxn id="19" idx="2"/>
+            <a:endCxn id="57" idx="0"/>
+          </p:cNvCxnSpPr>
+          <p:nvPr/>
+        </p:nvCxnSpPr>
+        <p:spPr>
+          <a:xfrm>
+            <a:off x="6333537" y="3823339"/>
+            <a:ext cx="0" cy="484891"/>
+          </a:xfrm>
+          <a:prstGeom prst="straightConnector1">
+            <a:avLst/>
+          </a:prstGeom>
+          <a:ln w="28575">
+            <a:solidFill>
+              <a:schemeClr val="tx2"/>
+            </a:solidFill>
+            <a:headEnd type="triangle"/>
+            <a:tailEnd type="triangle"/>
+          </a:ln>
+        </p:spPr>
+        <p:style>
+          <a:lnRef idx="1">
+            <a:schemeClr val="accent1"/>
+          </a:lnRef>
+          <a:fillRef idx="0">
+            <a:schemeClr val="accent1"/>
+          </a:fillRef>
+          <a:effectRef idx="0">
+            <a:schemeClr val="accent1"/>
+          </a:effectRef>
+          <a:fontRef idx="minor">
+            <a:schemeClr val="tx1"/>
+          </a:fontRef>
+        </p:style>
+      </p:cxnSp>
+      <p:sp>
+        <p:nvSpPr>
+          <p:cNvPr id="57" name="직사각형 56"/>
           <p:cNvSpPr/>
           <p:nvPr/>
         </p:nvSpPr>
         <p:spPr>
           <a:xfrm>
-            <a:off x="9374370" y="5038308"/>
+            <a:off x="5703537" y="4308230"/>
             <a:ext cx="1260000" cy="648000"/>
           </a:xfrm>
           <a:prstGeom prst="rect">
             <a:avLst/>
           </a:prstGeom>
           <a:solidFill>
-            <a:schemeClr val="accent5">
-              <a:lumMod val="60000"/>
-              <a:lumOff val="40000"/>
-            </a:schemeClr>
+            <a:srgbClr val="9DC3E6"/>
           </a:solidFill>
           <a:ln w="6350">
             <a:solidFill>
@@ -6152,15 +6264,7 @@
                   <a:schemeClr val="tx1"/>
                 </a:solidFill>
               </a:rPr>
-              <a:t>개인 </a:t>
-            </a:r>
-            <a:r>
-              <a:rPr lang="ko-KR" altLang="en-US" sz="1400" b="1" dirty="0" err="1" smtClean="0">
-                <a:solidFill>
-                  <a:schemeClr val="tx1"/>
-                </a:solidFill>
-              </a:rPr>
-              <a:t>북마크</a:t>
+              <a:t>팀 생성</a:t>
             </a:r>
             <a:endParaRPr lang="ko-KR" altLang="en-US" sz="1400" dirty="0">
               <a:solidFill>
@@ -6172,17 +6276,57 @@
       </p:sp>
       <p:cxnSp>
         <p:nvCxnSpPr>
-          <p:cNvPr id="82" name="직선 화살표 연결선 81"/>
+          <p:cNvPr id="63" name="직선 화살표 연결선 62"/>
           <p:cNvCxnSpPr>
-            <a:stCxn id="77" idx="3"/>
-            <a:endCxn id="81" idx="1"/>
+            <a:stCxn id="5" idx="2"/>
+            <a:endCxn id="4" idx="0"/>
           </p:cNvCxnSpPr>
           <p:nvPr/>
         </p:nvCxnSpPr>
         <p:spPr>
           <a:xfrm>
-            <a:off x="8748638" y="5362308"/>
-            <a:ext cx="625732" cy="0"/>
+            <a:off x="2473821" y="2532685"/>
+            <a:ext cx="0" cy="642654"/>
+          </a:xfrm>
+          <a:prstGeom prst="straightConnector1">
+            <a:avLst/>
+          </a:prstGeom>
+          <a:ln w="28575">
+            <a:solidFill>
+              <a:schemeClr val="tx2"/>
+            </a:solidFill>
+            <a:headEnd type="triangle"/>
+            <a:tailEnd type="triangle"/>
+          </a:ln>
+        </p:spPr>
+        <p:style>
+          <a:lnRef idx="1">
+            <a:schemeClr val="accent1"/>
+          </a:lnRef>
+          <a:fillRef idx="0">
+            <a:schemeClr val="accent1"/>
+          </a:fillRef>
+          <a:effectRef idx="0">
+            <a:schemeClr val="accent1"/>
+          </a:effectRef>
+          <a:fontRef idx="minor">
+            <a:schemeClr val="tx1"/>
+          </a:fontRef>
+        </p:style>
+      </p:cxnSp>
+      <p:cxnSp>
+        <p:nvCxnSpPr>
+          <p:cNvPr id="70" name="직선 화살표 연결선 69"/>
+          <p:cNvCxnSpPr>
+            <a:stCxn id="4" idx="3"/>
+            <a:endCxn id="57" idx="1"/>
+          </p:cNvCxnSpPr>
+          <p:nvPr/>
+        </p:nvCxnSpPr>
+        <p:spPr>
+          <a:xfrm>
+            <a:off x="3103821" y="3499339"/>
+            <a:ext cx="2599716" cy="1132891"/>
           </a:xfrm>
           <a:prstGeom prst="straightConnector1">
             <a:avLst/>
@@ -6219,6 +6363,13 @@
   <p:clrMapOvr>
     <a:masterClrMapping/>
   </p:clrMapOvr>
+  <p:timing>
+    <p:tnLst>
+      <p:par>
+        <p:cTn id="1" dur="indefinite" restart="never" nodeType="tmRoot"/>
+      </p:par>
+    </p:tnLst>
+  </p:timing>
 </p:sld>
 </file>
 

</xml_diff>